<commit_message>
Fix minor issues in two tutorials
</commit_message>
<xml_diff>
--- a/tutorials/SlicerRT_Tutorial_DoseSurfaceHistogram.pptx
+++ b/tutorials/SlicerRT_Tutorial_DoseSurfaceHistogram.pptx
@@ -6273,6 +6273,16 @@
           <a:prstGeom prst="rect">
             <a:avLst/>
           </a:prstGeom>
+          <a:ln>
+            <a:noFill/>
+          </a:ln>
+          <a:effectLst>
+            <a:outerShdw blurRad="292100" dist="139700" dir="2700000" algn="tl" rotWithShape="0">
+              <a:srgbClr val="333333">
+                <a:alpha val="65000"/>
+              </a:srgbClr>
+            </a:outerShdw>
+          </a:effectLst>
         </p:spPr>
       </p:pic>
       <p:sp>

</xml_diff>